<commit_message>
finish weka section 2
</commit_message>
<xml_diff>
--- a/Report 2 Weka Assignment/Weka Tutorial Slides/Section 2. Implementing your first machine learning algorithm (decision tree)/3. Configuration and visualization of decision trees.pptx
+++ b/Report 2 Weka Assignment/Weka Tutorial Slides/Section 2. Implementing your first machine learning algorithm (decision tree)/3. Configuration and visualization of decision trees.pptx
@@ -17,24 +17,6 @@
     <p:sldId id="287" r:id="rId11"/>
     <p:sldId id="288" r:id="rId12"/>
     <p:sldId id="289" r:id="rId13"/>
-    <p:sldId id="290" r:id="rId14"/>
-    <p:sldId id="291" r:id="rId15"/>
-    <p:sldId id="292" r:id="rId16"/>
-    <p:sldId id="293" r:id="rId17"/>
-    <p:sldId id="294" r:id="rId18"/>
-    <p:sldId id="295" r:id="rId19"/>
-    <p:sldId id="296" r:id="rId20"/>
-    <p:sldId id="297" r:id="rId21"/>
-    <p:sldId id="298" r:id="rId22"/>
-    <p:sldId id="299" r:id="rId23"/>
-    <p:sldId id="300" r:id="rId24"/>
-    <p:sldId id="301" r:id="rId25"/>
-    <p:sldId id="302" r:id="rId26"/>
-    <p:sldId id="303" r:id="rId27"/>
-    <p:sldId id="304" r:id="rId28"/>
-    <p:sldId id="305" r:id="rId29"/>
-    <p:sldId id="306" r:id="rId30"/>
-    <p:sldId id="307" r:id="rId31"/>
   </p:sldIdLst>
   <p:sldSz cx="12192000" cy="6858000"/>
   <p:notesSz cx="6858000" cy="9144000"/>
@@ -290,7 +272,7 @@
           <a:p>
             <a:fld id="{93E77F30-C913-4951-B471-158681376DA3}" type="datetimeFigureOut">
               <a:rPr lang="en-FI" smtClean="0"/>
-              <a:t>19/03/2024</a:t>
+              <a:t>06/04/2024</a:t>
             </a:fld>
             <a:endParaRPr lang="en-FI"/>
           </a:p>
@@ -490,7 +472,7 @@
           <a:p>
             <a:fld id="{93E77F30-C913-4951-B471-158681376DA3}" type="datetimeFigureOut">
               <a:rPr lang="en-FI" smtClean="0"/>
-              <a:t>19/03/2024</a:t>
+              <a:t>06/04/2024</a:t>
             </a:fld>
             <a:endParaRPr lang="en-FI"/>
           </a:p>
@@ -700,7 +682,7 @@
           <a:p>
             <a:fld id="{93E77F30-C913-4951-B471-158681376DA3}" type="datetimeFigureOut">
               <a:rPr lang="en-FI" smtClean="0"/>
-              <a:t>19/03/2024</a:t>
+              <a:t>06/04/2024</a:t>
             </a:fld>
             <a:endParaRPr lang="en-FI"/>
           </a:p>
@@ -900,7 +882,7 @@
           <a:p>
             <a:fld id="{93E77F30-C913-4951-B471-158681376DA3}" type="datetimeFigureOut">
               <a:rPr lang="en-FI" smtClean="0"/>
-              <a:t>19/03/2024</a:t>
+              <a:t>06/04/2024</a:t>
             </a:fld>
             <a:endParaRPr lang="en-FI"/>
           </a:p>
@@ -1176,7 +1158,7 @@
           <a:p>
             <a:fld id="{93E77F30-C913-4951-B471-158681376DA3}" type="datetimeFigureOut">
               <a:rPr lang="en-FI" smtClean="0"/>
-              <a:t>19/03/2024</a:t>
+              <a:t>06/04/2024</a:t>
             </a:fld>
             <a:endParaRPr lang="en-FI"/>
           </a:p>
@@ -1444,7 +1426,7 @@
           <a:p>
             <a:fld id="{93E77F30-C913-4951-B471-158681376DA3}" type="datetimeFigureOut">
               <a:rPr lang="en-FI" smtClean="0"/>
-              <a:t>19/03/2024</a:t>
+              <a:t>06/04/2024</a:t>
             </a:fld>
             <a:endParaRPr lang="en-FI"/>
           </a:p>
@@ -1859,7 +1841,7 @@
           <a:p>
             <a:fld id="{93E77F30-C913-4951-B471-158681376DA3}" type="datetimeFigureOut">
               <a:rPr lang="en-FI" smtClean="0"/>
-              <a:t>19/03/2024</a:t>
+              <a:t>06/04/2024</a:t>
             </a:fld>
             <a:endParaRPr lang="en-FI"/>
           </a:p>
@@ -2001,7 +1983,7 @@
           <a:p>
             <a:fld id="{93E77F30-C913-4951-B471-158681376DA3}" type="datetimeFigureOut">
               <a:rPr lang="en-FI" smtClean="0"/>
-              <a:t>19/03/2024</a:t>
+              <a:t>06/04/2024</a:t>
             </a:fld>
             <a:endParaRPr lang="en-FI"/>
           </a:p>
@@ -2114,7 +2096,7 @@
           <a:p>
             <a:fld id="{93E77F30-C913-4951-B471-158681376DA3}" type="datetimeFigureOut">
               <a:rPr lang="en-FI" smtClean="0"/>
-              <a:t>19/03/2024</a:t>
+              <a:t>06/04/2024</a:t>
             </a:fld>
             <a:endParaRPr lang="en-FI"/>
           </a:p>
@@ -2427,7 +2409,7 @@
           <a:p>
             <a:fld id="{93E77F30-C913-4951-B471-158681376DA3}" type="datetimeFigureOut">
               <a:rPr lang="en-FI" smtClean="0"/>
-              <a:t>19/03/2024</a:t>
+              <a:t>06/04/2024</a:t>
             </a:fld>
             <a:endParaRPr lang="en-FI"/>
           </a:p>
@@ -2716,7 +2698,7 @@
           <a:p>
             <a:fld id="{93E77F30-C913-4951-B471-158681376DA3}" type="datetimeFigureOut">
               <a:rPr lang="en-FI" smtClean="0"/>
-              <a:t>19/03/2024</a:t>
+              <a:t>06/04/2024</a:t>
             </a:fld>
             <a:endParaRPr lang="en-FI"/>
           </a:p>
@@ -2959,7 +2941,7 @@
           <a:p>
             <a:fld id="{93E77F30-C913-4951-B471-158681376DA3}" type="datetimeFigureOut">
               <a:rPr lang="en-FI" smtClean="0"/>
-              <a:t>19/03/2024</a:t>
+              <a:t>06/04/2024</a:t>
             </a:fld>
             <a:endParaRPr lang="en-FI"/>
           </a:p>
@@ -3382,6 +3364,36 @@
           <a:chExt cx="0" cy="0"/>
         </a:xfrm>
       </p:grpSpPr>
+      <p:pic>
+        <p:nvPicPr>
+          <p:cNvPr id="2" name="Picture 1">
+            <a:extLst>
+              <a:ext uri="{FF2B5EF4-FFF2-40B4-BE49-F238E27FC236}">
+                <a16:creationId xmlns:a16="http://schemas.microsoft.com/office/drawing/2014/main" id="{544CC144-C266-C1DF-071B-1AC6FD7D1C48}"/>
+              </a:ext>
+            </a:extLst>
+          </p:cNvPr>
+          <p:cNvPicPr>
+            <a:picLocks noChangeAspect="1"/>
+          </p:cNvPicPr>
+          <p:nvPr/>
+        </p:nvPicPr>
+        <p:blipFill>
+          <a:blip r:embed="rId2"/>
+          <a:stretch>
+            <a:fillRect/>
+          </a:stretch>
+        </p:blipFill>
+        <p:spPr>
+          <a:xfrm>
+            <a:off x="0" y="427995"/>
+            <a:ext cx="12192000" cy="6002009"/>
+          </a:xfrm>
+          <a:prstGeom prst="rect">
+            <a:avLst/>
+          </a:prstGeom>
+        </p:spPr>
+      </p:pic>
     </p:spTree>
     <p:extLst>
       <p:ext uri="{BB962C8B-B14F-4D97-AF65-F5344CB8AC3E}">
@@ -3418,6 +3430,36 @@
           <a:chExt cx="0" cy="0"/>
         </a:xfrm>
       </p:grpSpPr>
+      <p:pic>
+        <p:nvPicPr>
+          <p:cNvPr id="2" name="Picture 1">
+            <a:extLst>
+              <a:ext uri="{FF2B5EF4-FFF2-40B4-BE49-F238E27FC236}">
+                <a16:creationId xmlns:a16="http://schemas.microsoft.com/office/drawing/2014/main" id="{C7CF1FFD-4940-2204-A417-812CDC93A120}"/>
+              </a:ext>
+            </a:extLst>
+          </p:cNvPr>
+          <p:cNvPicPr>
+            <a:picLocks noChangeAspect="1"/>
+          </p:cNvPicPr>
+          <p:nvPr/>
+        </p:nvPicPr>
+        <p:blipFill>
+          <a:blip r:embed="rId2"/>
+          <a:stretch>
+            <a:fillRect/>
+          </a:stretch>
+        </p:blipFill>
+        <p:spPr>
+          <a:xfrm>
+            <a:off x="0" y="416188"/>
+            <a:ext cx="12192000" cy="6025623"/>
+          </a:xfrm>
+          <a:prstGeom prst="rect">
+            <a:avLst/>
+          </a:prstGeom>
+        </p:spPr>
+      </p:pic>
     </p:spTree>
     <p:extLst>
       <p:ext uri="{BB962C8B-B14F-4D97-AF65-F5344CB8AC3E}">
@@ -3454,6 +3496,36 @@
           <a:chExt cx="0" cy="0"/>
         </a:xfrm>
       </p:grpSpPr>
+      <p:pic>
+        <p:nvPicPr>
+          <p:cNvPr id="2" name="Picture 1">
+            <a:extLst>
+              <a:ext uri="{FF2B5EF4-FFF2-40B4-BE49-F238E27FC236}">
+                <a16:creationId xmlns:a16="http://schemas.microsoft.com/office/drawing/2014/main" id="{73B2EFEF-A937-EC7B-67E1-566EE1FB023B}"/>
+              </a:ext>
+            </a:extLst>
+          </p:cNvPr>
+          <p:cNvPicPr>
+            <a:picLocks noChangeAspect="1"/>
+          </p:cNvPicPr>
+          <p:nvPr/>
+        </p:nvPicPr>
+        <p:blipFill>
+          <a:blip r:embed="rId2"/>
+          <a:stretch>
+            <a:fillRect/>
+          </a:stretch>
+        </p:blipFill>
+        <p:spPr>
+          <a:xfrm>
+            <a:off x="0" y="414568"/>
+            <a:ext cx="12192000" cy="6028864"/>
+          </a:xfrm>
+          <a:prstGeom prst="rect">
+            <a:avLst/>
+          </a:prstGeom>
+        </p:spPr>
+      </p:pic>
     </p:spTree>
     <p:extLst>
       <p:ext uri="{BB962C8B-B14F-4D97-AF65-F5344CB8AC3E}">
@@ -3490,262 +3562,40 @@
           <a:chExt cx="0" cy="0"/>
         </a:xfrm>
       </p:grpSpPr>
+      <p:pic>
+        <p:nvPicPr>
+          <p:cNvPr id="2" name="Picture 1">
+            <a:extLst>
+              <a:ext uri="{FF2B5EF4-FFF2-40B4-BE49-F238E27FC236}">
+                <a16:creationId xmlns:a16="http://schemas.microsoft.com/office/drawing/2014/main" id="{EFD1859E-67E9-627A-F2C9-9900CF0C76F2}"/>
+              </a:ext>
+            </a:extLst>
+          </p:cNvPr>
+          <p:cNvPicPr>
+            <a:picLocks noChangeAspect="1"/>
+          </p:cNvPicPr>
+          <p:nvPr/>
+        </p:nvPicPr>
+        <p:blipFill>
+          <a:blip r:embed="rId2"/>
+          <a:stretch>
+            <a:fillRect/>
+          </a:stretch>
+        </p:blipFill>
+        <p:spPr>
+          <a:xfrm>
+            <a:off x="0" y="434650"/>
+            <a:ext cx="12192000" cy="5988700"/>
+          </a:xfrm>
+          <a:prstGeom prst="rect">
+            <a:avLst/>
+          </a:prstGeom>
+        </p:spPr>
+      </p:pic>
     </p:spTree>
     <p:extLst>
       <p:ext uri="{BB962C8B-B14F-4D97-AF65-F5344CB8AC3E}">
         <p14:creationId xmlns:p14="http://schemas.microsoft.com/office/powerpoint/2010/main" val="3042265994"/>
-      </p:ext>
-    </p:extLst>
-  </p:cSld>
-  <p:clrMapOvr>
-    <a:masterClrMapping/>
-  </p:clrMapOvr>
-</p:sld>
-</file>
-
-<file path=ppt/slides/slide13.xml><?xml version="1.0" encoding="utf-8"?>
-<p:sld xmlns:a="http://schemas.openxmlformats.org/drawingml/2006/main" xmlns:r="http://schemas.openxmlformats.org/officeDocument/2006/relationships" xmlns:p="http://schemas.openxmlformats.org/presentationml/2006/main">
-  <p:cSld>
-    <p:spTree>
-      <p:nvGrpSpPr>
-        <p:cNvPr id="1" name="">
-          <a:extLst>
-            <a:ext uri="{FF2B5EF4-FFF2-40B4-BE49-F238E27FC236}">
-              <a16:creationId xmlns:a16="http://schemas.microsoft.com/office/drawing/2014/main" id="{FC6EA96A-C46D-588D-5E65-64430F0538BB}"/>
-            </a:ext>
-          </a:extLst>
-        </p:cNvPr>
-        <p:cNvGrpSpPr/>
-        <p:nvPr/>
-      </p:nvGrpSpPr>
-      <p:grpSpPr>
-        <a:xfrm>
-          <a:off x="0" y="0"/>
-          <a:ext cx="0" cy="0"/>
-          <a:chOff x="0" y="0"/>
-          <a:chExt cx="0" cy="0"/>
-        </a:xfrm>
-      </p:grpSpPr>
-    </p:spTree>
-    <p:extLst>
-      <p:ext uri="{BB962C8B-B14F-4D97-AF65-F5344CB8AC3E}">
-        <p14:creationId xmlns:p14="http://schemas.microsoft.com/office/powerpoint/2010/main" val="1415619992"/>
-      </p:ext>
-    </p:extLst>
-  </p:cSld>
-  <p:clrMapOvr>
-    <a:masterClrMapping/>
-  </p:clrMapOvr>
-</p:sld>
-</file>
-
-<file path=ppt/slides/slide14.xml><?xml version="1.0" encoding="utf-8"?>
-<p:sld xmlns:a="http://schemas.openxmlformats.org/drawingml/2006/main" xmlns:r="http://schemas.openxmlformats.org/officeDocument/2006/relationships" xmlns:p="http://schemas.openxmlformats.org/presentationml/2006/main">
-  <p:cSld>
-    <p:spTree>
-      <p:nvGrpSpPr>
-        <p:cNvPr id="1" name="">
-          <a:extLst>
-            <a:ext uri="{FF2B5EF4-FFF2-40B4-BE49-F238E27FC236}">
-              <a16:creationId xmlns:a16="http://schemas.microsoft.com/office/drawing/2014/main" id="{FC6EA96A-C46D-588D-5E65-64430F0538BB}"/>
-            </a:ext>
-          </a:extLst>
-        </p:cNvPr>
-        <p:cNvGrpSpPr/>
-        <p:nvPr/>
-      </p:nvGrpSpPr>
-      <p:grpSpPr>
-        <a:xfrm>
-          <a:off x="0" y="0"/>
-          <a:ext cx="0" cy="0"/>
-          <a:chOff x="0" y="0"/>
-          <a:chExt cx="0" cy="0"/>
-        </a:xfrm>
-      </p:grpSpPr>
-    </p:spTree>
-    <p:extLst>
-      <p:ext uri="{BB962C8B-B14F-4D97-AF65-F5344CB8AC3E}">
-        <p14:creationId xmlns:p14="http://schemas.microsoft.com/office/powerpoint/2010/main" val="1884743217"/>
-      </p:ext>
-    </p:extLst>
-  </p:cSld>
-  <p:clrMapOvr>
-    <a:masterClrMapping/>
-  </p:clrMapOvr>
-</p:sld>
-</file>
-
-<file path=ppt/slides/slide15.xml><?xml version="1.0" encoding="utf-8"?>
-<p:sld xmlns:a="http://schemas.openxmlformats.org/drawingml/2006/main" xmlns:r="http://schemas.openxmlformats.org/officeDocument/2006/relationships" xmlns:p="http://schemas.openxmlformats.org/presentationml/2006/main">
-  <p:cSld>
-    <p:spTree>
-      <p:nvGrpSpPr>
-        <p:cNvPr id="1" name="">
-          <a:extLst>
-            <a:ext uri="{FF2B5EF4-FFF2-40B4-BE49-F238E27FC236}">
-              <a16:creationId xmlns:a16="http://schemas.microsoft.com/office/drawing/2014/main" id="{FC6EA96A-C46D-588D-5E65-64430F0538BB}"/>
-            </a:ext>
-          </a:extLst>
-        </p:cNvPr>
-        <p:cNvGrpSpPr/>
-        <p:nvPr/>
-      </p:nvGrpSpPr>
-      <p:grpSpPr>
-        <a:xfrm>
-          <a:off x="0" y="0"/>
-          <a:ext cx="0" cy="0"/>
-          <a:chOff x="0" y="0"/>
-          <a:chExt cx="0" cy="0"/>
-        </a:xfrm>
-      </p:grpSpPr>
-    </p:spTree>
-    <p:extLst>
-      <p:ext uri="{BB962C8B-B14F-4D97-AF65-F5344CB8AC3E}">
-        <p14:creationId xmlns:p14="http://schemas.microsoft.com/office/powerpoint/2010/main" val="4078656512"/>
-      </p:ext>
-    </p:extLst>
-  </p:cSld>
-  <p:clrMapOvr>
-    <a:masterClrMapping/>
-  </p:clrMapOvr>
-</p:sld>
-</file>
-
-<file path=ppt/slides/slide16.xml><?xml version="1.0" encoding="utf-8"?>
-<p:sld xmlns:a="http://schemas.openxmlformats.org/drawingml/2006/main" xmlns:r="http://schemas.openxmlformats.org/officeDocument/2006/relationships" xmlns:p="http://schemas.openxmlformats.org/presentationml/2006/main">
-  <p:cSld>
-    <p:spTree>
-      <p:nvGrpSpPr>
-        <p:cNvPr id="1" name="">
-          <a:extLst>
-            <a:ext uri="{FF2B5EF4-FFF2-40B4-BE49-F238E27FC236}">
-              <a16:creationId xmlns:a16="http://schemas.microsoft.com/office/drawing/2014/main" id="{FC6EA96A-C46D-588D-5E65-64430F0538BB}"/>
-            </a:ext>
-          </a:extLst>
-        </p:cNvPr>
-        <p:cNvGrpSpPr/>
-        <p:nvPr/>
-      </p:nvGrpSpPr>
-      <p:grpSpPr>
-        <a:xfrm>
-          <a:off x="0" y="0"/>
-          <a:ext cx="0" cy="0"/>
-          <a:chOff x="0" y="0"/>
-          <a:chExt cx="0" cy="0"/>
-        </a:xfrm>
-      </p:grpSpPr>
-    </p:spTree>
-    <p:extLst>
-      <p:ext uri="{BB962C8B-B14F-4D97-AF65-F5344CB8AC3E}">
-        <p14:creationId xmlns:p14="http://schemas.microsoft.com/office/powerpoint/2010/main" val="3892588999"/>
-      </p:ext>
-    </p:extLst>
-  </p:cSld>
-  <p:clrMapOvr>
-    <a:masterClrMapping/>
-  </p:clrMapOvr>
-</p:sld>
-</file>
-
-<file path=ppt/slides/slide17.xml><?xml version="1.0" encoding="utf-8"?>
-<p:sld xmlns:a="http://schemas.openxmlformats.org/drawingml/2006/main" xmlns:r="http://schemas.openxmlformats.org/officeDocument/2006/relationships" xmlns:p="http://schemas.openxmlformats.org/presentationml/2006/main">
-  <p:cSld>
-    <p:spTree>
-      <p:nvGrpSpPr>
-        <p:cNvPr id="1" name="">
-          <a:extLst>
-            <a:ext uri="{FF2B5EF4-FFF2-40B4-BE49-F238E27FC236}">
-              <a16:creationId xmlns:a16="http://schemas.microsoft.com/office/drawing/2014/main" id="{FC6EA96A-C46D-588D-5E65-64430F0538BB}"/>
-            </a:ext>
-          </a:extLst>
-        </p:cNvPr>
-        <p:cNvGrpSpPr/>
-        <p:nvPr/>
-      </p:nvGrpSpPr>
-      <p:grpSpPr>
-        <a:xfrm>
-          <a:off x="0" y="0"/>
-          <a:ext cx="0" cy="0"/>
-          <a:chOff x="0" y="0"/>
-          <a:chExt cx="0" cy="0"/>
-        </a:xfrm>
-      </p:grpSpPr>
-    </p:spTree>
-    <p:extLst>
-      <p:ext uri="{BB962C8B-B14F-4D97-AF65-F5344CB8AC3E}">
-        <p14:creationId xmlns:p14="http://schemas.microsoft.com/office/powerpoint/2010/main" val="1870829042"/>
-      </p:ext>
-    </p:extLst>
-  </p:cSld>
-  <p:clrMapOvr>
-    <a:masterClrMapping/>
-  </p:clrMapOvr>
-</p:sld>
-</file>
-
-<file path=ppt/slides/slide18.xml><?xml version="1.0" encoding="utf-8"?>
-<p:sld xmlns:a="http://schemas.openxmlformats.org/drawingml/2006/main" xmlns:r="http://schemas.openxmlformats.org/officeDocument/2006/relationships" xmlns:p="http://schemas.openxmlformats.org/presentationml/2006/main">
-  <p:cSld>
-    <p:spTree>
-      <p:nvGrpSpPr>
-        <p:cNvPr id="1" name="">
-          <a:extLst>
-            <a:ext uri="{FF2B5EF4-FFF2-40B4-BE49-F238E27FC236}">
-              <a16:creationId xmlns:a16="http://schemas.microsoft.com/office/drawing/2014/main" id="{FC6EA96A-C46D-588D-5E65-64430F0538BB}"/>
-            </a:ext>
-          </a:extLst>
-        </p:cNvPr>
-        <p:cNvGrpSpPr/>
-        <p:nvPr/>
-      </p:nvGrpSpPr>
-      <p:grpSpPr>
-        <a:xfrm>
-          <a:off x="0" y="0"/>
-          <a:ext cx="0" cy="0"/>
-          <a:chOff x="0" y="0"/>
-          <a:chExt cx="0" cy="0"/>
-        </a:xfrm>
-      </p:grpSpPr>
-    </p:spTree>
-    <p:extLst>
-      <p:ext uri="{BB962C8B-B14F-4D97-AF65-F5344CB8AC3E}">
-        <p14:creationId xmlns:p14="http://schemas.microsoft.com/office/powerpoint/2010/main" val="3209591013"/>
-      </p:ext>
-    </p:extLst>
-  </p:cSld>
-  <p:clrMapOvr>
-    <a:masterClrMapping/>
-  </p:clrMapOvr>
-</p:sld>
-</file>
-
-<file path=ppt/slides/slide19.xml><?xml version="1.0" encoding="utf-8"?>
-<p:sld xmlns:a="http://schemas.openxmlformats.org/drawingml/2006/main" xmlns:r="http://schemas.openxmlformats.org/officeDocument/2006/relationships" xmlns:p="http://schemas.openxmlformats.org/presentationml/2006/main">
-  <p:cSld>
-    <p:spTree>
-      <p:nvGrpSpPr>
-        <p:cNvPr id="1" name="">
-          <a:extLst>
-            <a:ext uri="{FF2B5EF4-FFF2-40B4-BE49-F238E27FC236}">
-              <a16:creationId xmlns:a16="http://schemas.microsoft.com/office/drawing/2014/main" id="{FC6EA96A-C46D-588D-5E65-64430F0538BB}"/>
-            </a:ext>
-          </a:extLst>
-        </p:cNvPr>
-        <p:cNvGrpSpPr/>
-        <p:nvPr/>
-      </p:nvGrpSpPr>
-      <p:grpSpPr>
-        <a:xfrm>
-          <a:off x="0" y="0"/>
-          <a:ext cx="0" cy="0"/>
-          <a:chOff x="0" y="0"/>
-          <a:chExt cx="0" cy="0"/>
-        </a:xfrm>
-      </p:grpSpPr>
-    </p:spTree>
-    <p:extLst>
-      <p:ext uri="{BB962C8B-B14F-4D97-AF65-F5344CB8AC3E}">
-        <p14:creationId xmlns:p14="http://schemas.microsoft.com/office/powerpoint/2010/main" val="1006187151"/>
       </p:ext>
     </p:extLst>
   </p:cSld>
@@ -3778,370 +3628,40 @@
           <a:chExt cx="0" cy="0"/>
         </a:xfrm>
       </p:grpSpPr>
+      <p:pic>
+        <p:nvPicPr>
+          <p:cNvPr id="2" name="Picture 1">
+            <a:extLst>
+              <a:ext uri="{FF2B5EF4-FFF2-40B4-BE49-F238E27FC236}">
+                <a16:creationId xmlns:a16="http://schemas.microsoft.com/office/drawing/2014/main" id="{6C0F7138-F6CC-3925-8D31-34A6048C6893}"/>
+              </a:ext>
+            </a:extLst>
+          </p:cNvPr>
+          <p:cNvPicPr>
+            <a:picLocks noChangeAspect="1"/>
+          </p:cNvPicPr>
+          <p:nvPr/>
+        </p:nvPicPr>
+        <p:blipFill>
+          <a:blip r:embed="rId2"/>
+          <a:stretch>
+            <a:fillRect/>
+          </a:stretch>
+        </p:blipFill>
+        <p:spPr>
+          <a:xfrm>
+            <a:off x="0" y="424687"/>
+            <a:ext cx="12192000" cy="6008626"/>
+          </a:xfrm>
+          <a:prstGeom prst="rect">
+            <a:avLst/>
+          </a:prstGeom>
+        </p:spPr>
+      </p:pic>
     </p:spTree>
     <p:extLst>
       <p:ext uri="{BB962C8B-B14F-4D97-AF65-F5344CB8AC3E}">
         <p14:creationId xmlns:p14="http://schemas.microsoft.com/office/powerpoint/2010/main" val="1719638969"/>
-      </p:ext>
-    </p:extLst>
-  </p:cSld>
-  <p:clrMapOvr>
-    <a:masterClrMapping/>
-  </p:clrMapOvr>
-</p:sld>
-</file>
-
-<file path=ppt/slides/slide20.xml><?xml version="1.0" encoding="utf-8"?>
-<p:sld xmlns:a="http://schemas.openxmlformats.org/drawingml/2006/main" xmlns:r="http://schemas.openxmlformats.org/officeDocument/2006/relationships" xmlns:p="http://schemas.openxmlformats.org/presentationml/2006/main">
-  <p:cSld>
-    <p:spTree>
-      <p:nvGrpSpPr>
-        <p:cNvPr id="1" name="">
-          <a:extLst>
-            <a:ext uri="{FF2B5EF4-FFF2-40B4-BE49-F238E27FC236}">
-              <a16:creationId xmlns:a16="http://schemas.microsoft.com/office/drawing/2014/main" id="{FC6EA96A-C46D-588D-5E65-64430F0538BB}"/>
-            </a:ext>
-          </a:extLst>
-        </p:cNvPr>
-        <p:cNvGrpSpPr/>
-        <p:nvPr/>
-      </p:nvGrpSpPr>
-      <p:grpSpPr>
-        <a:xfrm>
-          <a:off x="0" y="0"/>
-          <a:ext cx="0" cy="0"/>
-          <a:chOff x="0" y="0"/>
-          <a:chExt cx="0" cy="0"/>
-        </a:xfrm>
-      </p:grpSpPr>
-    </p:spTree>
-    <p:extLst>
-      <p:ext uri="{BB962C8B-B14F-4D97-AF65-F5344CB8AC3E}">
-        <p14:creationId xmlns:p14="http://schemas.microsoft.com/office/powerpoint/2010/main" val="2352267711"/>
-      </p:ext>
-    </p:extLst>
-  </p:cSld>
-  <p:clrMapOvr>
-    <a:masterClrMapping/>
-  </p:clrMapOvr>
-</p:sld>
-</file>
-
-<file path=ppt/slides/slide21.xml><?xml version="1.0" encoding="utf-8"?>
-<p:sld xmlns:a="http://schemas.openxmlformats.org/drawingml/2006/main" xmlns:r="http://schemas.openxmlformats.org/officeDocument/2006/relationships" xmlns:p="http://schemas.openxmlformats.org/presentationml/2006/main">
-  <p:cSld>
-    <p:spTree>
-      <p:nvGrpSpPr>
-        <p:cNvPr id="1" name="">
-          <a:extLst>
-            <a:ext uri="{FF2B5EF4-FFF2-40B4-BE49-F238E27FC236}">
-              <a16:creationId xmlns:a16="http://schemas.microsoft.com/office/drawing/2014/main" id="{FC6EA96A-C46D-588D-5E65-64430F0538BB}"/>
-            </a:ext>
-          </a:extLst>
-        </p:cNvPr>
-        <p:cNvGrpSpPr/>
-        <p:nvPr/>
-      </p:nvGrpSpPr>
-      <p:grpSpPr>
-        <a:xfrm>
-          <a:off x="0" y="0"/>
-          <a:ext cx="0" cy="0"/>
-          <a:chOff x="0" y="0"/>
-          <a:chExt cx="0" cy="0"/>
-        </a:xfrm>
-      </p:grpSpPr>
-    </p:spTree>
-    <p:extLst>
-      <p:ext uri="{BB962C8B-B14F-4D97-AF65-F5344CB8AC3E}">
-        <p14:creationId xmlns:p14="http://schemas.microsoft.com/office/powerpoint/2010/main" val="4270204272"/>
-      </p:ext>
-    </p:extLst>
-  </p:cSld>
-  <p:clrMapOvr>
-    <a:masterClrMapping/>
-  </p:clrMapOvr>
-</p:sld>
-</file>
-
-<file path=ppt/slides/slide22.xml><?xml version="1.0" encoding="utf-8"?>
-<p:sld xmlns:a="http://schemas.openxmlformats.org/drawingml/2006/main" xmlns:r="http://schemas.openxmlformats.org/officeDocument/2006/relationships" xmlns:p="http://schemas.openxmlformats.org/presentationml/2006/main">
-  <p:cSld>
-    <p:spTree>
-      <p:nvGrpSpPr>
-        <p:cNvPr id="1" name="">
-          <a:extLst>
-            <a:ext uri="{FF2B5EF4-FFF2-40B4-BE49-F238E27FC236}">
-              <a16:creationId xmlns:a16="http://schemas.microsoft.com/office/drawing/2014/main" id="{FC6EA96A-C46D-588D-5E65-64430F0538BB}"/>
-            </a:ext>
-          </a:extLst>
-        </p:cNvPr>
-        <p:cNvGrpSpPr/>
-        <p:nvPr/>
-      </p:nvGrpSpPr>
-      <p:grpSpPr>
-        <a:xfrm>
-          <a:off x="0" y="0"/>
-          <a:ext cx="0" cy="0"/>
-          <a:chOff x="0" y="0"/>
-          <a:chExt cx="0" cy="0"/>
-        </a:xfrm>
-      </p:grpSpPr>
-    </p:spTree>
-    <p:extLst>
-      <p:ext uri="{BB962C8B-B14F-4D97-AF65-F5344CB8AC3E}">
-        <p14:creationId xmlns:p14="http://schemas.microsoft.com/office/powerpoint/2010/main" val="3936020293"/>
-      </p:ext>
-    </p:extLst>
-  </p:cSld>
-  <p:clrMapOvr>
-    <a:masterClrMapping/>
-  </p:clrMapOvr>
-</p:sld>
-</file>
-
-<file path=ppt/slides/slide23.xml><?xml version="1.0" encoding="utf-8"?>
-<p:sld xmlns:a="http://schemas.openxmlformats.org/drawingml/2006/main" xmlns:r="http://schemas.openxmlformats.org/officeDocument/2006/relationships" xmlns:p="http://schemas.openxmlformats.org/presentationml/2006/main">
-  <p:cSld>
-    <p:spTree>
-      <p:nvGrpSpPr>
-        <p:cNvPr id="1" name="">
-          <a:extLst>
-            <a:ext uri="{FF2B5EF4-FFF2-40B4-BE49-F238E27FC236}">
-              <a16:creationId xmlns:a16="http://schemas.microsoft.com/office/drawing/2014/main" id="{FC6EA96A-C46D-588D-5E65-64430F0538BB}"/>
-            </a:ext>
-          </a:extLst>
-        </p:cNvPr>
-        <p:cNvGrpSpPr/>
-        <p:nvPr/>
-      </p:nvGrpSpPr>
-      <p:grpSpPr>
-        <a:xfrm>
-          <a:off x="0" y="0"/>
-          <a:ext cx="0" cy="0"/>
-          <a:chOff x="0" y="0"/>
-          <a:chExt cx="0" cy="0"/>
-        </a:xfrm>
-      </p:grpSpPr>
-    </p:spTree>
-    <p:extLst>
-      <p:ext uri="{BB962C8B-B14F-4D97-AF65-F5344CB8AC3E}">
-        <p14:creationId xmlns:p14="http://schemas.microsoft.com/office/powerpoint/2010/main" val="2149769742"/>
-      </p:ext>
-    </p:extLst>
-  </p:cSld>
-  <p:clrMapOvr>
-    <a:masterClrMapping/>
-  </p:clrMapOvr>
-</p:sld>
-</file>
-
-<file path=ppt/slides/slide24.xml><?xml version="1.0" encoding="utf-8"?>
-<p:sld xmlns:a="http://schemas.openxmlformats.org/drawingml/2006/main" xmlns:r="http://schemas.openxmlformats.org/officeDocument/2006/relationships" xmlns:p="http://schemas.openxmlformats.org/presentationml/2006/main">
-  <p:cSld>
-    <p:spTree>
-      <p:nvGrpSpPr>
-        <p:cNvPr id="1" name="">
-          <a:extLst>
-            <a:ext uri="{FF2B5EF4-FFF2-40B4-BE49-F238E27FC236}">
-              <a16:creationId xmlns:a16="http://schemas.microsoft.com/office/drawing/2014/main" id="{FC6EA96A-C46D-588D-5E65-64430F0538BB}"/>
-            </a:ext>
-          </a:extLst>
-        </p:cNvPr>
-        <p:cNvGrpSpPr/>
-        <p:nvPr/>
-      </p:nvGrpSpPr>
-      <p:grpSpPr>
-        <a:xfrm>
-          <a:off x="0" y="0"/>
-          <a:ext cx="0" cy="0"/>
-          <a:chOff x="0" y="0"/>
-          <a:chExt cx="0" cy="0"/>
-        </a:xfrm>
-      </p:grpSpPr>
-    </p:spTree>
-    <p:extLst>
-      <p:ext uri="{BB962C8B-B14F-4D97-AF65-F5344CB8AC3E}">
-        <p14:creationId xmlns:p14="http://schemas.microsoft.com/office/powerpoint/2010/main" val="241357418"/>
-      </p:ext>
-    </p:extLst>
-  </p:cSld>
-  <p:clrMapOvr>
-    <a:masterClrMapping/>
-  </p:clrMapOvr>
-</p:sld>
-</file>
-
-<file path=ppt/slides/slide25.xml><?xml version="1.0" encoding="utf-8"?>
-<p:sld xmlns:a="http://schemas.openxmlformats.org/drawingml/2006/main" xmlns:r="http://schemas.openxmlformats.org/officeDocument/2006/relationships" xmlns:p="http://schemas.openxmlformats.org/presentationml/2006/main">
-  <p:cSld>
-    <p:spTree>
-      <p:nvGrpSpPr>
-        <p:cNvPr id="1" name="">
-          <a:extLst>
-            <a:ext uri="{FF2B5EF4-FFF2-40B4-BE49-F238E27FC236}">
-              <a16:creationId xmlns:a16="http://schemas.microsoft.com/office/drawing/2014/main" id="{FC6EA96A-C46D-588D-5E65-64430F0538BB}"/>
-            </a:ext>
-          </a:extLst>
-        </p:cNvPr>
-        <p:cNvGrpSpPr/>
-        <p:nvPr/>
-      </p:nvGrpSpPr>
-      <p:grpSpPr>
-        <a:xfrm>
-          <a:off x="0" y="0"/>
-          <a:ext cx="0" cy="0"/>
-          <a:chOff x="0" y="0"/>
-          <a:chExt cx="0" cy="0"/>
-        </a:xfrm>
-      </p:grpSpPr>
-    </p:spTree>
-    <p:extLst>
-      <p:ext uri="{BB962C8B-B14F-4D97-AF65-F5344CB8AC3E}">
-        <p14:creationId xmlns:p14="http://schemas.microsoft.com/office/powerpoint/2010/main" val="3657499615"/>
-      </p:ext>
-    </p:extLst>
-  </p:cSld>
-  <p:clrMapOvr>
-    <a:masterClrMapping/>
-  </p:clrMapOvr>
-</p:sld>
-</file>
-
-<file path=ppt/slides/slide26.xml><?xml version="1.0" encoding="utf-8"?>
-<p:sld xmlns:a="http://schemas.openxmlformats.org/drawingml/2006/main" xmlns:r="http://schemas.openxmlformats.org/officeDocument/2006/relationships" xmlns:p="http://schemas.openxmlformats.org/presentationml/2006/main">
-  <p:cSld>
-    <p:spTree>
-      <p:nvGrpSpPr>
-        <p:cNvPr id="1" name="">
-          <a:extLst>
-            <a:ext uri="{FF2B5EF4-FFF2-40B4-BE49-F238E27FC236}">
-              <a16:creationId xmlns:a16="http://schemas.microsoft.com/office/drawing/2014/main" id="{FC6EA96A-C46D-588D-5E65-64430F0538BB}"/>
-            </a:ext>
-          </a:extLst>
-        </p:cNvPr>
-        <p:cNvGrpSpPr/>
-        <p:nvPr/>
-      </p:nvGrpSpPr>
-      <p:grpSpPr>
-        <a:xfrm>
-          <a:off x="0" y="0"/>
-          <a:ext cx="0" cy="0"/>
-          <a:chOff x="0" y="0"/>
-          <a:chExt cx="0" cy="0"/>
-        </a:xfrm>
-      </p:grpSpPr>
-    </p:spTree>
-    <p:extLst>
-      <p:ext uri="{BB962C8B-B14F-4D97-AF65-F5344CB8AC3E}">
-        <p14:creationId xmlns:p14="http://schemas.microsoft.com/office/powerpoint/2010/main" val="3365481895"/>
-      </p:ext>
-    </p:extLst>
-  </p:cSld>
-  <p:clrMapOvr>
-    <a:masterClrMapping/>
-  </p:clrMapOvr>
-</p:sld>
-</file>
-
-<file path=ppt/slides/slide27.xml><?xml version="1.0" encoding="utf-8"?>
-<p:sld xmlns:a="http://schemas.openxmlformats.org/drawingml/2006/main" xmlns:r="http://schemas.openxmlformats.org/officeDocument/2006/relationships" xmlns:p="http://schemas.openxmlformats.org/presentationml/2006/main">
-  <p:cSld>
-    <p:spTree>
-      <p:nvGrpSpPr>
-        <p:cNvPr id="1" name="">
-          <a:extLst>
-            <a:ext uri="{FF2B5EF4-FFF2-40B4-BE49-F238E27FC236}">
-              <a16:creationId xmlns:a16="http://schemas.microsoft.com/office/drawing/2014/main" id="{FC6EA96A-C46D-588D-5E65-64430F0538BB}"/>
-            </a:ext>
-          </a:extLst>
-        </p:cNvPr>
-        <p:cNvGrpSpPr/>
-        <p:nvPr/>
-      </p:nvGrpSpPr>
-      <p:grpSpPr>
-        <a:xfrm>
-          <a:off x="0" y="0"/>
-          <a:ext cx="0" cy="0"/>
-          <a:chOff x="0" y="0"/>
-          <a:chExt cx="0" cy="0"/>
-        </a:xfrm>
-      </p:grpSpPr>
-    </p:spTree>
-    <p:extLst>
-      <p:ext uri="{BB962C8B-B14F-4D97-AF65-F5344CB8AC3E}">
-        <p14:creationId xmlns:p14="http://schemas.microsoft.com/office/powerpoint/2010/main" val="3465658490"/>
-      </p:ext>
-    </p:extLst>
-  </p:cSld>
-  <p:clrMapOvr>
-    <a:masterClrMapping/>
-  </p:clrMapOvr>
-</p:sld>
-</file>
-
-<file path=ppt/slides/slide28.xml><?xml version="1.0" encoding="utf-8"?>
-<p:sld xmlns:a="http://schemas.openxmlformats.org/drawingml/2006/main" xmlns:r="http://schemas.openxmlformats.org/officeDocument/2006/relationships" xmlns:p="http://schemas.openxmlformats.org/presentationml/2006/main">
-  <p:cSld>
-    <p:spTree>
-      <p:nvGrpSpPr>
-        <p:cNvPr id="1" name="">
-          <a:extLst>
-            <a:ext uri="{FF2B5EF4-FFF2-40B4-BE49-F238E27FC236}">
-              <a16:creationId xmlns:a16="http://schemas.microsoft.com/office/drawing/2014/main" id="{FC6EA96A-C46D-588D-5E65-64430F0538BB}"/>
-            </a:ext>
-          </a:extLst>
-        </p:cNvPr>
-        <p:cNvGrpSpPr/>
-        <p:nvPr/>
-      </p:nvGrpSpPr>
-      <p:grpSpPr>
-        <a:xfrm>
-          <a:off x="0" y="0"/>
-          <a:ext cx="0" cy="0"/>
-          <a:chOff x="0" y="0"/>
-          <a:chExt cx="0" cy="0"/>
-        </a:xfrm>
-      </p:grpSpPr>
-    </p:spTree>
-    <p:extLst>
-      <p:ext uri="{BB962C8B-B14F-4D97-AF65-F5344CB8AC3E}">
-        <p14:creationId xmlns:p14="http://schemas.microsoft.com/office/powerpoint/2010/main" val="1546841529"/>
-      </p:ext>
-    </p:extLst>
-  </p:cSld>
-  <p:clrMapOvr>
-    <a:masterClrMapping/>
-  </p:clrMapOvr>
-</p:sld>
-</file>
-
-<file path=ppt/slides/slide29.xml><?xml version="1.0" encoding="utf-8"?>
-<p:sld xmlns:a="http://schemas.openxmlformats.org/drawingml/2006/main" xmlns:r="http://schemas.openxmlformats.org/officeDocument/2006/relationships" xmlns:p="http://schemas.openxmlformats.org/presentationml/2006/main">
-  <p:cSld>
-    <p:spTree>
-      <p:nvGrpSpPr>
-        <p:cNvPr id="1" name="">
-          <a:extLst>
-            <a:ext uri="{FF2B5EF4-FFF2-40B4-BE49-F238E27FC236}">
-              <a16:creationId xmlns:a16="http://schemas.microsoft.com/office/drawing/2014/main" id="{FC6EA96A-C46D-588D-5E65-64430F0538BB}"/>
-            </a:ext>
-          </a:extLst>
-        </p:cNvPr>
-        <p:cNvGrpSpPr/>
-        <p:nvPr/>
-      </p:nvGrpSpPr>
-      <p:grpSpPr>
-        <a:xfrm>
-          <a:off x="0" y="0"/>
-          <a:ext cx="0" cy="0"/>
-          <a:chOff x="0" y="0"/>
-          <a:chExt cx="0" cy="0"/>
-        </a:xfrm>
-      </p:grpSpPr>
-    </p:spTree>
-    <p:extLst>
-      <p:ext uri="{BB962C8B-B14F-4D97-AF65-F5344CB8AC3E}">
-        <p14:creationId xmlns:p14="http://schemas.microsoft.com/office/powerpoint/2010/main" val="3756898028"/>
       </p:ext>
     </p:extLst>
   </p:cSld>
@@ -4174,46 +3694,40 @@
           <a:chExt cx="0" cy="0"/>
         </a:xfrm>
       </p:grpSpPr>
+      <p:pic>
+        <p:nvPicPr>
+          <p:cNvPr id="2" name="Picture 1">
+            <a:extLst>
+              <a:ext uri="{FF2B5EF4-FFF2-40B4-BE49-F238E27FC236}">
+                <a16:creationId xmlns:a16="http://schemas.microsoft.com/office/drawing/2014/main" id="{EE68DE14-5005-5468-6E50-AF21DA0BCF8D}"/>
+              </a:ext>
+            </a:extLst>
+          </p:cNvPr>
+          <p:cNvPicPr>
+            <a:picLocks noChangeAspect="1"/>
+          </p:cNvPicPr>
+          <p:nvPr/>
+        </p:nvPicPr>
+        <p:blipFill>
+          <a:blip r:embed="rId2"/>
+          <a:stretch>
+            <a:fillRect/>
+          </a:stretch>
+        </p:blipFill>
+        <p:spPr>
+          <a:xfrm>
+            <a:off x="0" y="431297"/>
+            <a:ext cx="12192000" cy="5995406"/>
+          </a:xfrm>
+          <a:prstGeom prst="rect">
+            <a:avLst/>
+          </a:prstGeom>
+        </p:spPr>
+      </p:pic>
     </p:spTree>
     <p:extLst>
       <p:ext uri="{BB962C8B-B14F-4D97-AF65-F5344CB8AC3E}">
         <p14:creationId xmlns:p14="http://schemas.microsoft.com/office/powerpoint/2010/main" val="1837522681"/>
-      </p:ext>
-    </p:extLst>
-  </p:cSld>
-  <p:clrMapOvr>
-    <a:masterClrMapping/>
-  </p:clrMapOvr>
-</p:sld>
-</file>
-
-<file path=ppt/slides/slide30.xml><?xml version="1.0" encoding="utf-8"?>
-<p:sld xmlns:a="http://schemas.openxmlformats.org/drawingml/2006/main" xmlns:r="http://schemas.openxmlformats.org/officeDocument/2006/relationships" xmlns:p="http://schemas.openxmlformats.org/presentationml/2006/main">
-  <p:cSld>
-    <p:spTree>
-      <p:nvGrpSpPr>
-        <p:cNvPr id="1" name="">
-          <a:extLst>
-            <a:ext uri="{FF2B5EF4-FFF2-40B4-BE49-F238E27FC236}">
-              <a16:creationId xmlns:a16="http://schemas.microsoft.com/office/drawing/2014/main" id="{FC6EA96A-C46D-588D-5E65-64430F0538BB}"/>
-            </a:ext>
-          </a:extLst>
-        </p:cNvPr>
-        <p:cNvGrpSpPr/>
-        <p:nvPr/>
-      </p:nvGrpSpPr>
-      <p:grpSpPr>
-        <a:xfrm>
-          <a:off x="0" y="0"/>
-          <a:ext cx="0" cy="0"/>
-          <a:chOff x="0" y="0"/>
-          <a:chExt cx="0" cy="0"/>
-        </a:xfrm>
-      </p:grpSpPr>
-    </p:spTree>
-    <p:extLst>
-      <p:ext uri="{BB962C8B-B14F-4D97-AF65-F5344CB8AC3E}">
-        <p14:creationId xmlns:p14="http://schemas.microsoft.com/office/powerpoint/2010/main" val="2427473524"/>
       </p:ext>
     </p:extLst>
   </p:cSld>
@@ -4246,6 +3760,36 @@
           <a:chExt cx="0" cy="0"/>
         </a:xfrm>
       </p:grpSpPr>
+      <p:pic>
+        <p:nvPicPr>
+          <p:cNvPr id="2" name="Picture 1">
+            <a:extLst>
+              <a:ext uri="{FF2B5EF4-FFF2-40B4-BE49-F238E27FC236}">
+                <a16:creationId xmlns:a16="http://schemas.microsoft.com/office/drawing/2014/main" id="{50A658EA-442B-CEBC-2C1B-D6BA49D0BCDA}"/>
+              </a:ext>
+            </a:extLst>
+          </p:cNvPr>
+          <p:cNvPicPr>
+            <a:picLocks noChangeAspect="1"/>
+          </p:cNvPicPr>
+          <p:nvPr/>
+        </p:nvPicPr>
+        <p:blipFill>
+          <a:blip r:embed="rId2"/>
+          <a:stretch>
+            <a:fillRect/>
+          </a:stretch>
+        </p:blipFill>
+        <p:spPr>
+          <a:xfrm>
+            <a:off x="0" y="427944"/>
+            <a:ext cx="12192000" cy="6002112"/>
+          </a:xfrm>
+          <a:prstGeom prst="rect">
+            <a:avLst/>
+          </a:prstGeom>
+        </p:spPr>
+      </p:pic>
     </p:spTree>
     <p:extLst>
       <p:ext uri="{BB962C8B-B14F-4D97-AF65-F5344CB8AC3E}">
@@ -4282,6 +3826,36 @@
           <a:chExt cx="0" cy="0"/>
         </a:xfrm>
       </p:grpSpPr>
+      <p:pic>
+        <p:nvPicPr>
+          <p:cNvPr id="2" name="Picture 1">
+            <a:extLst>
+              <a:ext uri="{FF2B5EF4-FFF2-40B4-BE49-F238E27FC236}">
+                <a16:creationId xmlns:a16="http://schemas.microsoft.com/office/drawing/2014/main" id="{5CAEBF80-58F9-9F19-8C85-1CF54C24C84C}"/>
+              </a:ext>
+            </a:extLst>
+          </p:cNvPr>
+          <p:cNvPicPr>
+            <a:picLocks noChangeAspect="1"/>
+          </p:cNvPicPr>
+          <p:nvPr/>
+        </p:nvPicPr>
+        <p:blipFill>
+          <a:blip r:embed="rId2"/>
+          <a:stretch>
+            <a:fillRect/>
+          </a:stretch>
+        </p:blipFill>
+        <p:spPr>
+          <a:xfrm>
+            <a:off x="0" y="426292"/>
+            <a:ext cx="12192000" cy="6005415"/>
+          </a:xfrm>
+          <a:prstGeom prst="rect">
+            <a:avLst/>
+          </a:prstGeom>
+        </p:spPr>
+      </p:pic>
     </p:spTree>
     <p:extLst>
       <p:ext uri="{BB962C8B-B14F-4D97-AF65-F5344CB8AC3E}">
@@ -4318,6 +3892,36 @@
           <a:chExt cx="0" cy="0"/>
         </a:xfrm>
       </p:grpSpPr>
+      <p:pic>
+        <p:nvPicPr>
+          <p:cNvPr id="2" name="Picture 1">
+            <a:extLst>
+              <a:ext uri="{FF2B5EF4-FFF2-40B4-BE49-F238E27FC236}">
+                <a16:creationId xmlns:a16="http://schemas.microsoft.com/office/drawing/2014/main" id="{02886967-8D82-652A-861C-19C0A6E295CF}"/>
+              </a:ext>
+            </a:extLst>
+          </p:cNvPr>
+          <p:cNvPicPr>
+            <a:picLocks noChangeAspect="1"/>
+          </p:cNvPicPr>
+          <p:nvPr/>
+        </p:nvPicPr>
+        <p:blipFill>
+          <a:blip r:embed="rId2"/>
+          <a:stretch>
+            <a:fillRect/>
+          </a:stretch>
+        </p:blipFill>
+        <p:spPr>
+          <a:xfrm>
+            <a:off x="0" y="436418"/>
+            <a:ext cx="12192000" cy="5985164"/>
+          </a:xfrm>
+          <a:prstGeom prst="rect">
+            <a:avLst/>
+          </a:prstGeom>
+        </p:spPr>
+      </p:pic>
     </p:spTree>
     <p:extLst>
       <p:ext uri="{BB962C8B-B14F-4D97-AF65-F5344CB8AC3E}">
@@ -4354,6 +3958,36 @@
           <a:chExt cx="0" cy="0"/>
         </a:xfrm>
       </p:grpSpPr>
+      <p:pic>
+        <p:nvPicPr>
+          <p:cNvPr id="2" name="Picture 1">
+            <a:extLst>
+              <a:ext uri="{FF2B5EF4-FFF2-40B4-BE49-F238E27FC236}">
+                <a16:creationId xmlns:a16="http://schemas.microsoft.com/office/drawing/2014/main" id="{8F7E95D2-7145-7134-D80F-CA80C9DDB913}"/>
+              </a:ext>
+            </a:extLst>
+          </p:cNvPr>
+          <p:cNvPicPr>
+            <a:picLocks noChangeAspect="1"/>
+          </p:cNvPicPr>
+          <p:nvPr/>
+        </p:nvPicPr>
+        <p:blipFill>
+          <a:blip r:embed="rId2"/>
+          <a:stretch>
+            <a:fillRect/>
+          </a:stretch>
+        </p:blipFill>
+        <p:spPr>
+          <a:xfrm>
+            <a:off x="0" y="438003"/>
+            <a:ext cx="12192000" cy="5981993"/>
+          </a:xfrm>
+          <a:prstGeom prst="rect">
+            <a:avLst/>
+          </a:prstGeom>
+        </p:spPr>
+      </p:pic>
     </p:spTree>
     <p:extLst>
       <p:ext uri="{BB962C8B-B14F-4D97-AF65-F5344CB8AC3E}">
@@ -4390,6 +4024,36 @@
           <a:chExt cx="0" cy="0"/>
         </a:xfrm>
       </p:grpSpPr>
+      <p:pic>
+        <p:nvPicPr>
+          <p:cNvPr id="2" name="Picture 1">
+            <a:extLst>
+              <a:ext uri="{FF2B5EF4-FFF2-40B4-BE49-F238E27FC236}">
+                <a16:creationId xmlns:a16="http://schemas.microsoft.com/office/drawing/2014/main" id="{00F01C44-E835-A951-7BA5-9A8C131C4E68}"/>
+              </a:ext>
+            </a:extLst>
+          </p:cNvPr>
+          <p:cNvPicPr>
+            <a:picLocks noChangeAspect="1"/>
+          </p:cNvPicPr>
+          <p:nvPr/>
+        </p:nvPicPr>
+        <p:blipFill>
+          <a:blip r:embed="rId2"/>
+          <a:stretch>
+            <a:fillRect/>
+          </a:stretch>
+        </p:blipFill>
+        <p:spPr>
+          <a:xfrm>
+            <a:off x="0" y="439712"/>
+            <a:ext cx="12192000" cy="5978576"/>
+          </a:xfrm>
+          <a:prstGeom prst="rect">
+            <a:avLst/>
+          </a:prstGeom>
+        </p:spPr>
+      </p:pic>
     </p:spTree>
     <p:extLst>
       <p:ext uri="{BB962C8B-B14F-4D97-AF65-F5344CB8AC3E}">
@@ -4426,6 +4090,36 @@
           <a:chExt cx="0" cy="0"/>
         </a:xfrm>
       </p:grpSpPr>
+      <p:pic>
+        <p:nvPicPr>
+          <p:cNvPr id="2" name="Picture 1">
+            <a:extLst>
+              <a:ext uri="{FF2B5EF4-FFF2-40B4-BE49-F238E27FC236}">
+                <a16:creationId xmlns:a16="http://schemas.microsoft.com/office/drawing/2014/main" id="{D3C9B3F6-3986-8049-8108-05418472998F}"/>
+              </a:ext>
+            </a:extLst>
+          </p:cNvPr>
+          <p:cNvPicPr>
+            <a:picLocks noChangeAspect="1"/>
+          </p:cNvPicPr>
+          <p:nvPr/>
+        </p:nvPicPr>
+        <p:blipFill>
+          <a:blip r:embed="rId2"/>
+          <a:stretch>
+            <a:fillRect/>
+          </a:stretch>
+        </p:blipFill>
+        <p:spPr>
+          <a:xfrm>
+            <a:off x="0" y="421237"/>
+            <a:ext cx="12192000" cy="6015525"/>
+          </a:xfrm>
+          <a:prstGeom prst="rect">
+            <a:avLst/>
+          </a:prstGeom>
+        </p:spPr>
+      </p:pic>
     </p:spTree>
     <p:extLst>
       <p:ext uri="{BB962C8B-B14F-4D97-AF65-F5344CB8AC3E}">

</xml_diff>